<commit_message>
Adding name of presentation
</commit_message>
<xml_diff>
--- a/MiniQ/Testing/Testing.pptx
+++ b/MiniQ/Testing/Testing.pptx
@@ -165,6 +165,65 @@
               </c:strCache>
             </c:strRef>
           </c:tx>
+          <c:dLbls>
+            <c:dLbl>
+              <c:idx val="0"/>
+              <c:layout/>
+              <c:numFmt formatCode="0%" sourceLinked="0"/>
+              <c:spPr/>
+              <c:txPr>
+                <a:bodyPr/>
+                <a:lstStyle/>
+                <a:p>
+                  <a:pPr>
+                    <a:defRPr sz="4800">
+                      <a:latin typeface="Calibri" pitchFamily="34" charset="0"/>
+                      <a:cs typeface="Calibri" pitchFamily="34" charset="0"/>
+                    </a:defRPr>
+                  </a:pPr>
+                  <a:endParaRPr lang="ru-RU"/>
+                </a:p>
+              </c:txPr>
+              <c:showLegendKey val="0"/>
+              <c:showVal val="1"/>
+              <c:showCatName val="0"/>
+              <c:showSerName val="0"/>
+              <c:showPercent val="0"/>
+              <c:showBubbleSize val="0"/>
+            </c:dLbl>
+            <c:dLbl>
+              <c:idx val="1"/>
+              <c:layout/>
+              <c:numFmt formatCode="0%" sourceLinked="0"/>
+              <c:spPr/>
+              <c:txPr>
+                <a:bodyPr/>
+                <a:lstStyle/>
+                <a:p>
+                  <a:pPr>
+                    <a:defRPr sz="4800">
+                      <a:latin typeface="Calibri" pitchFamily="34" charset="0"/>
+                      <a:cs typeface="Calibri" pitchFamily="34" charset="0"/>
+                    </a:defRPr>
+                  </a:pPr>
+                  <a:endParaRPr lang="ru-RU"/>
+                </a:p>
+              </c:txPr>
+              <c:showLegendKey val="0"/>
+              <c:showVal val="1"/>
+              <c:showCatName val="0"/>
+              <c:showSerName val="0"/>
+              <c:showPercent val="0"/>
+              <c:showBubbleSize val="0"/>
+            </c:dLbl>
+            <c:numFmt formatCode="0%" sourceLinked="0"/>
+            <c:showLegendKey val="0"/>
+            <c:showVal val="0"/>
+            <c:showCatName val="0"/>
+            <c:showSerName val="0"/>
+            <c:showPercent val="0"/>
+            <c:showBubbleSize val="0"/>
+          </c:dLbls>
           <c:cat>
             <c:strRef>
               <c:f>Лист1!$A$2:$A$3</c:f>
@@ -182,6 +241,50 @@
           <c:val>
             <c:numRef>
               <c:f>Лист1!$B$2:$B$3</c:f>
+              <c:numCache>
+                <c:formatCode>Основной</c:formatCode>
+                <c:ptCount val="2"/>
+                <c:pt idx="0">
+                  <c:v>0.4</c:v>
+                </c:pt>
+                <c:pt idx="1">
+                  <c:v>0.6</c:v>
+                </c:pt>
+              </c:numCache>
+            </c:numRef>
+          </c:val>
+        </c:ser>
+        <c:ser>
+          <c:idx val="1"/>
+          <c:order val="1"/>
+          <c:tx>
+            <c:strRef>
+              <c:f>Лист1!$C$1</c:f>
+              <c:strCache>
+                <c:ptCount val="1"/>
+                <c:pt idx="0">
+                  <c:v>Столбец1</c:v>
+                </c:pt>
+              </c:strCache>
+            </c:strRef>
+          </c:tx>
+          <c:cat>
+            <c:strRef>
+              <c:f>Лист1!$A$2:$A$3</c:f>
+              <c:strCache>
+                <c:ptCount val="2"/>
+                <c:pt idx="0">
+                  <c:v>Да</c:v>
+                </c:pt>
+                <c:pt idx="1">
+                  <c:v>Нет</c:v>
+                </c:pt>
+              </c:strCache>
+            </c:strRef>
+          </c:cat>
+          <c:val>
+            <c:numRef>
+              <c:f>Лист1!$C$2:$C$3</c:f>
               <c:numCache>
                 <c:formatCode>Основной</c:formatCode>
                 <c:ptCount val="2"/>
@@ -215,8 +318,8 @@
           <c:yMode val="edge"/>
           <c:x val="0.6882242990654206"/>
           <c:y val="0.2768123582009876"/>
-          <c:w val="0.24051401869158878"/>
-          <c:h val="0.34853641176208905"/>
+          <c:w val="0.1486034755413243"/>
+          <c:h val="0.25315227545709329"/>
         </c:manualLayout>
       </c:layout>
       <c:overlay val="0"/>
@@ -333,7 +436,7 @@
           <a:p>
             <a:fld id="{A7BC830B-94E7-4506-9C42-3DC2E6160751}" type="datetimeFigureOut">
               <a:rPr lang="ru-RU" smtClean="0"/>
-              <a:t>15.05.2016</a:t>
+              <a:t>18.05.2016</a:t>
             </a:fld>
             <a:endParaRPr lang="ru-RU"/>
           </a:p>
@@ -1855,7 +1958,7 @@
           <a:p>
             <a:fld id="{A5A02310-A014-425C-B76F-E7BC72180DC0}" type="datetimeFigureOut">
               <a:rPr lang="en-US" smtClean="0"/>
-              <a:t>5/15/2016</a:t>
+              <a:t>5/18/2016</a:t>
             </a:fld>
             <a:endParaRPr lang="en-US"/>
           </a:p>
@@ -2046,7 +2149,7 @@
           <a:p>
             <a:fld id="{A5A02310-A014-425C-B76F-E7BC72180DC0}" type="datetimeFigureOut">
               <a:rPr lang="en-US" smtClean="0"/>
-              <a:t>5/15/2016</a:t>
+              <a:t>5/18/2016</a:t>
             </a:fld>
             <a:endParaRPr lang="en-US"/>
           </a:p>
@@ -2231,7 +2334,7 @@
           <a:p>
             <a:fld id="{A5A02310-A014-425C-B76F-E7BC72180DC0}" type="datetimeFigureOut">
               <a:rPr lang="en-US" smtClean="0"/>
-              <a:t>5/15/2016</a:t>
+              <a:t>5/18/2016</a:t>
             </a:fld>
             <a:endParaRPr lang="en-US"/>
           </a:p>
@@ -2494,7 +2597,7 @@
           <a:p>
             <a:fld id="{A5A02310-A014-425C-B76F-E7BC72180DC0}" type="datetimeFigureOut">
               <a:rPr lang="en-US" smtClean="0"/>
-              <a:t>5/15/2016</a:t>
+              <a:t>5/18/2016</a:t>
             </a:fld>
             <a:endParaRPr lang="en-US"/>
           </a:p>
@@ -2910,7 +3013,7 @@
           <a:p>
             <a:fld id="{A5A02310-A014-425C-B76F-E7BC72180DC0}" type="datetimeFigureOut">
               <a:rPr lang="en-US" smtClean="0"/>
-              <a:t>5/15/2016</a:t>
+              <a:t>5/18/2016</a:t>
             </a:fld>
             <a:endParaRPr lang="en-US"/>
           </a:p>
@@ -3152,7 +3255,7 @@
           <a:p>
             <a:fld id="{A5A02310-A014-425C-B76F-E7BC72180DC0}" type="datetimeFigureOut">
               <a:rPr lang="en-US" smtClean="0"/>
-              <a:t>5/15/2016</a:t>
+              <a:t>5/18/2016</a:t>
             </a:fld>
             <a:endParaRPr lang="en-US"/>
           </a:p>
@@ -3388,7 +3491,7 @@
           <a:p>
             <a:fld id="{A5A02310-A014-425C-B76F-E7BC72180DC0}" type="datetimeFigureOut">
               <a:rPr lang="en-US" smtClean="0"/>
-              <a:t>5/15/2016</a:t>
+              <a:t>5/18/2016</a:t>
             </a:fld>
             <a:endParaRPr lang="en-US"/>
           </a:p>
@@ -3583,7 +3686,7 @@
           <a:p>
             <a:fld id="{A5A02310-A014-425C-B76F-E7BC72180DC0}" type="datetimeFigureOut">
               <a:rPr lang="en-US" smtClean="0"/>
-              <a:t>5/15/2016</a:t>
+              <a:t>5/18/2016</a:t>
             </a:fld>
             <a:endParaRPr lang="en-US"/>
           </a:p>
@@ -3681,7 +3784,7 @@
           <a:p>
             <a:fld id="{A5A02310-A014-425C-B76F-E7BC72180DC0}" type="datetimeFigureOut">
               <a:rPr lang="en-US" smtClean="0"/>
-              <a:t>5/15/2016</a:t>
+              <a:t>5/18/2016</a:t>
             </a:fld>
             <a:endParaRPr lang="en-US"/>
           </a:p>
@@ -3817,7 +3920,7 @@
           <a:p>
             <a:fld id="{A5A02310-A014-425C-B76F-E7BC72180DC0}" type="datetimeFigureOut">
               <a:rPr lang="en-US" smtClean="0"/>
-              <a:t>5/15/2016</a:t>
+              <a:t>5/18/2016</a:t>
             </a:fld>
             <a:endParaRPr lang="en-US"/>
           </a:p>
@@ -4335,7 +4438,7 @@
           <a:p>
             <a:fld id="{A5A02310-A014-425C-B76F-E7BC72180DC0}" type="datetimeFigureOut">
               <a:rPr lang="en-US" smtClean="0"/>
-              <a:t>5/15/2016</a:t>
+              <a:t>5/18/2016</a:t>
             </a:fld>
             <a:endParaRPr lang="en-US"/>
           </a:p>
@@ -4596,7 +4699,7 @@
           <a:p>
             <a:fld id="{A5A02310-A014-425C-B76F-E7BC72180DC0}" type="datetimeFigureOut">
               <a:rPr lang="en-US" smtClean="0"/>
-              <a:t>5/15/2016</a:t>
+              <a:t>5/18/2016</a:t>
             </a:fld>
             <a:endParaRPr lang="en-US"/>
           </a:p>
@@ -5137,12 +5240,12 @@
       </p:grpSpPr>
       <p:sp>
         <p:nvSpPr>
-          <p:cNvPr id="2" name="Title 1"/>
-          <p:cNvSpPr>
-            <a:spLocks noGrp="1"/>
-          </p:cNvSpPr>
-          <p:nvPr>
-            <p:ph type="ctrTitle"/>
+          <p:cNvPr id="3" name="Subtitle 2"/>
+          <p:cNvSpPr>
+            <a:spLocks noGrp="1"/>
+          </p:cNvSpPr>
+          <p:nvPr>
+            <p:ph type="subTitle" idx="1"/>
           </p:nvPr>
         </p:nvSpPr>
         <p:spPr/>
@@ -5150,26 +5253,41 @@
           <a:bodyPr/>
           <a:lstStyle/>
           <a:p>
+            <a:r>
+              <a:rPr lang="ru-RU" dirty="0" smtClean="0"/>
+              <a:t>Виталий Квятковский</a:t>
+            </a:r>
             <a:endParaRPr lang="en-US" dirty="0"/>
           </a:p>
         </p:txBody>
       </p:sp>
       <p:sp>
         <p:nvSpPr>
-          <p:cNvPr id="3" name="Subtitle 2"/>
-          <p:cNvSpPr>
-            <a:spLocks noGrp="1"/>
-          </p:cNvSpPr>
-          <p:nvPr>
-            <p:ph type="subTitle" idx="1"/>
-          </p:nvPr>
-        </p:nvSpPr>
-        <p:spPr/>
-        <p:txBody>
-          <a:bodyPr/>
-          <a:lstStyle/>
-          <a:p>
-            <a:endParaRPr lang="en-US"/>
+          <p:cNvPr id="5" name="TextBox 4"/>
+          <p:cNvSpPr txBox="1"/>
+          <p:nvPr/>
+        </p:nvSpPr>
+        <p:spPr>
+          <a:xfrm>
+            <a:off x="925551" y="2787806"/>
+            <a:ext cx="8037457" cy="830997"/>
+          </a:xfrm>
+          <a:prstGeom prst="rect">
+            <a:avLst/>
+          </a:prstGeom>
+          <a:noFill/>
+        </p:spPr>
+        <p:txBody>
+          <a:bodyPr wrap="none" rtlCol="0">
+            <a:spAutoFit/>
+          </a:bodyPr>
+          <a:lstStyle/>
+          <a:p>
+            <a:r>
+              <a:rPr lang="ru-RU" sz="4800" dirty="0" smtClean="0"/>
+              <a:t>Какие авто-тесты нам нужны?</a:t>
+            </a:r>
+            <a:endParaRPr lang="ru-RU" sz="4800" dirty="0"/>
           </a:p>
         </p:txBody>
       </p:sp>
@@ -5360,7 +5478,7 @@
             <p:ph sz="quarter" idx="1"/>
             <p:extLst>
               <p:ext uri="{D42A27DB-BD31-4B8C-83A1-F6EECF244321}">
-                <p14:modId xmlns:p14="http://schemas.microsoft.com/office/powerpoint/2010/main" val="287259858"/>
+                <p14:modId xmlns:p14="http://schemas.microsoft.com/office/powerpoint/2010/main" val="2093162433"/>
               </p:ext>
             </p:extLst>
           </p:nvPr>
@@ -6316,11 +6434,7 @@
           <a:p>
             <a:r>
               <a:rPr lang="ru-RU" dirty="0" smtClean="0"/>
-              <a:t>Что </a:t>
-            </a:r>
-            <a:r>
-              <a:rPr lang="ru-RU" dirty="0" smtClean="0"/>
-              <a:t>автоматизировать?</a:t>
+              <a:t>Что автоматизировать?</a:t>
             </a:r>
             <a:endParaRPr lang="en-US" dirty="0"/>
           </a:p>
@@ -6354,15 +6468,7 @@
                   <a:srgbClr val="00B050"/>
                 </a:solidFill>
               </a:rPr>
-              <a:t>Регрессионное </a:t>
-            </a:r>
-            <a:r>
-              <a:rPr lang="ru-RU" sz="2400" dirty="0" smtClean="0">
-                <a:solidFill>
-                  <a:srgbClr val="00B050"/>
-                </a:solidFill>
-              </a:rPr>
-              <a:t>тестирование</a:t>
+              <a:t>Регрессионное тестирование</a:t>
             </a:r>
           </a:p>
           <a:p>
@@ -6402,7 +6508,6 @@
               <a:rPr lang="ru-RU" sz="2400" dirty="0" smtClean="0"/>
               <a:t>)</a:t>
             </a:r>
-            <a:endParaRPr lang="ru-RU" sz="2400" dirty="0" smtClean="0"/>
           </a:p>
           <a:p>
             <a:pPr>
@@ -6412,13 +6517,8 @@
             </a:pPr>
             <a:r>
               <a:rPr lang="ru-RU" sz="2400" dirty="0" smtClean="0"/>
-              <a:t>Нагрузочное </a:t>
-            </a:r>
-            <a:r>
-              <a:rPr lang="ru-RU" sz="2400" dirty="0" smtClean="0"/>
-              <a:t>тестирование</a:t>
-            </a:r>
-            <a:endParaRPr lang="ru-RU" sz="2400" dirty="0" smtClean="0"/>
+              <a:t>Нагрузочное тестирование</a:t>
+            </a:r>
           </a:p>
           <a:p>
             <a:pPr>
@@ -6447,52 +6547,23 @@
                   <a:srgbClr val="00B050"/>
                 </a:solidFill>
               </a:rPr>
-              <a:t>Где </a:t>
-            </a:r>
+              <a:t>Где автоматическая верификация более предпочтительна</a:t>
+            </a:r>
+          </a:p>
+          <a:p>
+            <a:pPr lvl="1">
+              <a:lnSpc>
+                <a:spcPct val="160000"/>
+              </a:lnSpc>
+            </a:pPr>
             <a:r>
               <a:rPr lang="ru-RU" sz="2400" dirty="0" smtClean="0">
                 <a:solidFill>
                   <a:srgbClr val="00B050"/>
                 </a:solidFill>
               </a:rPr>
-              <a:t>автоматическая </a:t>
-            </a:r>
-            <a:r>
-              <a:rPr lang="ru-RU" sz="2400" dirty="0" smtClean="0">
-                <a:solidFill>
-                  <a:srgbClr val="00B050"/>
-                </a:solidFill>
-              </a:rPr>
-              <a:t>верификация более предпочтительна</a:t>
-            </a:r>
-          </a:p>
-          <a:p>
-            <a:pPr lvl="1">
-              <a:lnSpc>
-                <a:spcPct val="160000"/>
-              </a:lnSpc>
-            </a:pPr>
-            <a:r>
-              <a:rPr lang="ru-RU" sz="2400" dirty="0" smtClean="0">
-                <a:solidFill>
-                  <a:srgbClr val="00B050"/>
-                </a:solidFill>
-              </a:rPr>
-              <a:t>Сложные </a:t>
-            </a:r>
-            <a:r>
-              <a:rPr lang="ru-RU" sz="2400" dirty="0" smtClean="0">
-                <a:solidFill>
-                  <a:srgbClr val="00B050"/>
-                </a:solidFill>
-              </a:rPr>
-              <a:t>расчеты</a:t>
-            </a:r>
-            <a:endParaRPr lang="ru-RU" sz="2400" dirty="0" smtClean="0">
-              <a:solidFill>
-                <a:srgbClr val="00B050"/>
-              </a:solidFill>
-            </a:endParaRPr>
+              <a:t>Сложные расчеты</a:t>
+            </a:r>
           </a:p>
         </p:txBody>
       </p:sp>
@@ -6550,11 +6621,7 @@
           <a:p>
             <a:r>
               <a:rPr lang="ru-RU" dirty="0" smtClean="0"/>
-              <a:t>Зачем </a:t>
-            </a:r>
-            <a:r>
-              <a:rPr lang="ru-RU" dirty="0" smtClean="0"/>
-              <a:t>автоматизировать (опрос)</a:t>
+              <a:t>Зачем автоматизировать (опрос)</a:t>
             </a:r>
             <a:endParaRPr lang="en-US" dirty="0"/>
           </a:p>
@@ -6654,7 +6721,6 @@
               <a:rPr lang="ru-RU" dirty="0" smtClean="0"/>
               <a:t>Окупаются со временем</a:t>
             </a:r>
-            <a:endParaRPr lang="ru-RU" dirty="0" smtClean="0"/>
           </a:p>
         </p:txBody>
       </p:sp>
@@ -7330,11 +7396,6 @@
               </a:rPr>
               <a:t>надежнее</a:t>
             </a:r>
-            <a:endParaRPr lang="ru-RU" sz="3200" dirty="0" smtClean="0">
-              <a:solidFill>
-                <a:srgbClr val="00B050"/>
-              </a:solidFill>
-            </a:endParaRPr>
           </a:p>
           <a:p>
             <a:pPr lvl="1"/>
@@ -7344,23 +7405,7 @@
                   <a:srgbClr val="00B050"/>
                 </a:solidFill>
               </a:rPr>
-              <a:t>Оптимизация </a:t>
-            </a:r>
-            <a:r>
-              <a:rPr lang="ru-RU" sz="3600" dirty="0" smtClean="0">
-                <a:solidFill>
-                  <a:srgbClr val="00B050"/>
-                </a:solidFill>
-              </a:rPr>
-              <a:t>использования </a:t>
-            </a:r>
-            <a:r>
-              <a:rPr lang="ru-RU" sz="3600" dirty="0" smtClean="0">
-                <a:solidFill>
-                  <a:srgbClr val="00B050"/>
-                </a:solidFill>
-              </a:rPr>
-              <a:t>времени </a:t>
+              <a:t>Оптимизация использования времени </a:t>
             </a:r>
           </a:p>
           <a:p>
@@ -7394,24 +7439,15 @@
             <a:pPr lvl="1"/>
             <a:r>
               <a:rPr lang="ru-RU" sz="3600" dirty="0" smtClean="0"/>
-              <a:t>Автоматический отчет </a:t>
-            </a:r>
+              <a:t>Автоматический отчет о тестировании</a:t>
+            </a:r>
+          </a:p>
+          <a:p>
+            <a:pPr lvl="1"/>
             <a:r>
               <a:rPr lang="ru-RU" sz="3600" dirty="0" smtClean="0"/>
-              <a:t>о тестировании</a:t>
-            </a:r>
-          </a:p>
-          <a:p>
-            <a:pPr lvl="1"/>
-            <a:r>
-              <a:rPr lang="ru-RU" sz="3600" dirty="0" smtClean="0"/>
-              <a:t>Выполнение в </a:t>
-            </a:r>
-            <a:r>
-              <a:rPr lang="ru-RU" sz="3600" dirty="0" smtClean="0"/>
-              <a:t>фоне</a:t>
-            </a:r>
-            <a:endParaRPr lang="ru-RU" sz="3600" dirty="0" smtClean="0"/>
+              <a:t>Выполнение в фоне</a:t>
+            </a:r>
           </a:p>
         </p:txBody>
       </p:sp>
@@ -7487,7 +7523,9 @@
         </p:nvSpPr>
         <p:spPr/>
         <p:txBody>
-          <a:bodyPr/>
+          <a:bodyPr>
+            <a:normAutofit lnSpcReduction="10000"/>
+          </a:bodyPr>
           <a:lstStyle/>
           <a:p>
             <a:pPr marL="514350" indent="-514350">
@@ -8596,13 +8634,8 @@
             </a:pPr>
             <a:r>
               <a:rPr lang="ru-RU" dirty="0" smtClean="0"/>
-              <a:t>Удалить </a:t>
-            </a:r>
-            <a:r>
-              <a:rPr lang="ru-RU" dirty="0" smtClean="0"/>
-              <a:t>позже</a:t>
-            </a:r>
-            <a:endParaRPr lang="ru-RU" dirty="0" smtClean="0"/>
+              <a:t>Удалить позже</a:t>
+            </a:r>
           </a:p>
           <a:p>
             <a:pPr>
@@ -8854,19 +8887,11 @@
             </a:pPr>
             <a:r>
               <a:rPr lang="ru-RU" sz="3600" dirty="0" smtClean="0"/>
-              <a:t>На уровне </a:t>
-            </a:r>
-            <a:r>
-              <a:rPr lang="ru-RU" sz="3600" dirty="0" smtClean="0"/>
-              <a:t>интерфейса пользователя (</a:t>
+              <a:t>На уровне интерфейса пользователя (</a:t>
             </a:r>
             <a:r>
               <a:rPr lang="en-US" sz="3600" dirty="0" smtClean="0"/>
-              <a:t>service/API/GUI</a:t>
-            </a:r>
-            <a:r>
-              <a:rPr lang="en-US" sz="3600" dirty="0" smtClean="0"/>
-              <a:t>)</a:t>
+              <a:t>service/API/GUI)</a:t>
             </a:r>
             <a:endParaRPr lang="en-US" sz="3600" dirty="0"/>
           </a:p>
@@ -9117,11 +9142,11 @@
   <p:clrMapOvr>
     <a:masterClrMapping/>
   </p:clrMapOvr>
-  <mc:AlternateContent xmlns:mc="http://schemas.openxmlformats.org/markup-compatibility/2006">
-    <mc:Choice xmlns:p14="http://schemas.microsoft.com/office/powerpoint/2010/main" Requires="p14">
+  <mc:AlternateContent xmlns:mc="http://schemas.openxmlformats.org/markup-compatibility/2006" xmlns:p14="http://schemas.microsoft.com/office/powerpoint/2010/main">
+    <mc:Choice Requires="p14">
       <p:transition spd="slow" p14:dur="2000"/>
     </mc:Choice>
-    <mc:Fallback>
+    <mc:Fallback xmlns="">
       <p:transition spd="slow"/>
     </mc:Fallback>
   </mc:AlternateContent>
@@ -9506,13 +9531,8 @@
             <a:pPr lvl="1"/>
             <a:r>
               <a:rPr lang="ru-RU" dirty="0" smtClean="0"/>
-              <a:t> </a:t>
-            </a:r>
-            <a:r>
-              <a:rPr lang="ru-RU" dirty="0" smtClean="0"/>
-              <a:t>Функциональные</a:t>
-            </a:r>
-            <a:endParaRPr lang="ru-RU" dirty="0" smtClean="0"/>
+              <a:t> Функциональные</a:t>
+            </a:r>
           </a:p>
           <a:p>
             <a:pPr lvl="2"/>
@@ -9542,7 +9562,6 @@
               <a:rPr lang="ru-RU" dirty="0" smtClean="0"/>
               <a:t>Нагрузочные</a:t>
             </a:r>
-            <a:endParaRPr lang="ru-RU" dirty="0" smtClean="0"/>
           </a:p>
           <a:p>
             <a:pPr lvl="1"/>
@@ -9550,7 +9569,6 @@
               <a:rPr lang="en-US" dirty="0" smtClean="0"/>
               <a:t>Usability</a:t>
             </a:r>
-            <a:endParaRPr lang="en-US" dirty="0" smtClean="0"/>
           </a:p>
         </p:txBody>
       </p:sp>
@@ -9693,7 +9711,6 @@
               <a:rPr lang="ru-RU" sz="3200" dirty="0" smtClean="0"/>
               <a:t>Инструменты</a:t>
             </a:r>
-            <a:endParaRPr lang="ru-RU" sz="3200" dirty="0" smtClean="0"/>
           </a:p>
           <a:p>
             <a:pPr lvl="1"/>
@@ -9995,11 +10012,7 @@
           <a:p>
             <a:r>
               <a:rPr lang="ru-RU" sz="2800" dirty="0" smtClean="0"/>
-              <a:t> </a:t>
-            </a:r>
-            <a:r>
-              <a:rPr lang="ru-RU" sz="2800" dirty="0" smtClean="0"/>
-              <a:t>Базы данных</a:t>
+              <a:t> Базы данных</a:t>
             </a:r>
           </a:p>
           <a:p>
@@ -10038,10 +10051,6 @@
             </a:r>
           </a:p>
           <a:p>
-            <a:pPr>
-              <a:buFontTx/>
-              <a:buChar char="-"/>
-            </a:pPr>
             <a:r>
               <a:rPr lang="ru-RU" sz="2800" dirty="0" smtClean="0"/>
               <a:t>Файловая система</a:t>
@@ -10073,10 +10082,6 @@
             <a:endParaRPr lang="en-US" sz="2400" dirty="0" smtClean="0"/>
           </a:p>
           <a:p>
-            <a:pPr>
-              <a:buFontTx/>
-              <a:buChar char="-"/>
-            </a:pPr>
             <a:r>
               <a:rPr lang="en-US" sz="2800" dirty="0" smtClean="0">
                 <a:latin typeface="Calibri" pitchFamily="34" charset="0"/>
@@ -10241,14 +10246,7 @@
                 <a:latin typeface="Calibri" pitchFamily="34" charset="0"/>
                 <a:cs typeface="Calibri" pitchFamily="34" charset="0"/>
               </a:rPr>
-              <a:t>Continuous </a:t>
-            </a:r>
-            <a:r>
-              <a:rPr lang="en-US" sz="3200" dirty="0" smtClean="0">
-                <a:latin typeface="Calibri" pitchFamily="34" charset="0"/>
-                <a:cs typeface="Calibri" pitchFamily="34" charset="0"/>
-              </a:rPr>
-              <a:t>Integration</a:t>
+              <a:t>Continuous Integration</a:t>
             </a:r>
             <a:r>
               <a:rPr lang="ru-RU" sz="3200" dirty="0" smtClean="0">
@@ -10271,10 +10269,6 @@
               </a:rPr>
               <a:t>smoke test)</a:t>
             </a:r>
-            <a:endParaRPr lang="en-US" sz="3200" i="1" dirty="0" smtClean="0">
-              <a:latin typeface="Calibri" pitchFamily="34" charset="0"/>
-              <a:cs typeface="Calibri" pitchFamily="34" charset="0"/>
-            </a:endParaRPr>
           </a:p>
           <a:p>
             <a:r>
@@ -10515,11 +10509,11 @@
   <p:clrMapOvr>
     <a:masterClrMapping/>
   </p:clrMapOvr>
-  <mc:AlternateContent xmlns:mc="http://schemas.openxmlformats.org/markup-compatibility/2006">
-    <mc:Choice xmlns:p14="http://schemas.microsoft.com/office/powerpoint/2010/main" Requires="p14">
+  <mc:AlternateContent xmlns:mc="http://schemas.openxmlformats.org/markup-compatibility/2006" xmlns:p14="http://schemas.microsoft.com/office/powerpoint/2010/main">
+    <mc:Choice Requires="p14">
       <p:transition spd="slow" p14:dur="2000"/>
     </mc:Choice>
-    <mc:Fallback>
+    <mc:Fallback xmlns="">
       <p:transition spd="slow"/>
     </mc:Fallback>
   </mc:AlternateContent>

</xml_diff>